<commit_message>
first step of splitting SIS into SIS4 and SIS5
</commit_message>
<xml_diff>
--- a/resources/icons.pptx
+++ b/resources/icons.pptx
@@ -5,12 +5,13 @@
     <p:sldMasterId id="2147483672" r:id="rId1"/>
   </p:sldMasterIdLst>
   <p:notesMasterIdLst>
-    <p:notesMasterId r:id="rId5"/>
+    <p:notesMasterId r:id="rId6"/>
   </p:notesMasterIdLst>
   <p:sldIdLst>
     <p:sldId id="318" r:id="rId2"/>
-    <p:sldId id="388" r:id="rId3"/>
-    <p:sldId id="574" r:id="rId4"/>
+    <p:sldId id="575" r:id="rId3"/>
+    <p:sldId id="388" r:id="rId4"/>
+    <p:sldId id="574" r:id="rId5"/>
   </p:sldIdLst>
   <p:sldSz cx="5486400" cy="5486400"/>
   <p:notesSz cx="6858000" cy="9144000"/>
@@ -199,7 +200,7 @@
           <a:p>
             <a:fld id="{173FD435-C119-4590-9D53-7CAF83F19020}" type="datetimeFigureOut">
               <a:rPr lang="en-US" smtClean="0"/>
-              <a:t>11/26/2018</a:t>
+              <a:t>2/15/2019</a:t>
             </a:fld>
             <a:endParaRPr lang="en-US"/>
           </a:p>
@@ -550,6 +551,90 @@
 </p:notes>
 </file>
 
+<file path=ppt/notesSlides/notesSlide2.xml><?xml version="1.0" encoding="utf-8"?>
+<p:notes xmlns:a="http://schemas.openxmlformats.org/drawingml/2006/main" xmlns:r="http://schemas.openxmlformats.org/officeDocument/2006/relationships" xmlns:p="http://schemas.openxmlformats.org/presentationml/2006/main">
+  <p:cSld>
+    <p:spTree>
+      <p:nvGrpSpPr>
+        <p:cNvPr id="1" name=""/>
+        <p:cNvGrpSpPr/>
+        <p:nvPr/>
+      </p:nvGrpSpPr>
+      <p:grpSpPr>
+        <a:xfrm>
+          <a:off x="0" y="0"/>
+          <a:ext cx="0" cy="0"/>
+          <a:chOff x="0" y="0"/>
+          <a:chExt cx="0" cy="0"/>
+        </a:xfrm>
+      </p:grpSpPr>
+      <p:sp>
+        <p:nvSpPr>
+          <p:cNvPr id="2" name="Slide Image Placeholder 1"/>
+          <p:cNvSpPr>
+            <a:spLocks noGrp="1" noRot="1" noChangeAspect="1"/>
+          </p:cNvSpPr>
+          <p:nvPr>
+            <p:ph type="sldImg"/>
+          </p:nvPr>
+        </p:nvSpPr>
+        <p:spPr/>
+      </p:sp>
+      <p:sp>
+        <p:nvSpPr>
+          <p:cNvPr id="3" name="Notes Placeholder 2"/>
+          <p:cNvSpPr>
+            <a:spLocks noGrp="1"/>
+          </p:cNvSpPr>
+          <p:nvPr>
+            <p:ph type="body" idx="1"/>
+          </p:nvPr>
+        </p:nvSpPr>
+        <p:spPr/>
+        <p:txBody>
+          <a:bodyPr/>
+          <a:lstStyle/>
+          <a:p>
+            <a:endParaRPr lang="en-US" dirty="0"/>
+          </a:p>
+        </p:txBody>
+      </p:sp>
+      <p:sp>
+        <p:nvSpPr>
+          <p:cNvPr id="4" name="Slide Number Placeholder 3"/>
+          <p:cNvSpPr>
+            <a:spLocks noGrp="1"/>
+          </p:cNvSpPr>
+          <p:nvPr>
+            <p:ph type="sldNum" sz="quarter" idx="5"/>
+          </p:nvPr>
+        </p:nvSpPr>
+        <p:spPr/>
+        <p:txBody>
+          <a:bodyPr/>
+          <a:lstStyle/>
+          <a:p>
+            <a:fld id="{EE6CE23A-BB01-46B4-BDD6-2DE3EFA83C70}" type="slidenum">
+              <a:rPr lang="en-US" smtClean="0"/>
+              <a:t>2</a:t>
+            </a:fld>
+            <a:endParaRPr lang="en-US"/>
+          </a:p>
+        </p:txBody>
+      </p:sp>
+    </p:spTree>
+    <p:extLst>
+      <p:ext uri="{BB962C8B-B14F-4D97-AF65-F5344CB8AC3E}">
+        <p14:creationId xmlns:p14="http://schemas.microsoft.com/office/powerpoint/2010/main" val="999011433"/>
+      </p:ext>
+    </p:extLst>
+  </p:cSld>
+  <p:clrMapOvr>
+    <a:masterClrMapping/>
+  </p:clrMapOvr>
+</p:notes>
+</file>
+
 <file path=ppt/slideLayouts/slideLayout1.xml><?xml version="1.0" encoding="utf-8"?>
 <p:sldLayout xmlns:a="http://schemas.openxmlformats.org/drawingml/2006/main" xmlns:r="http://schemas.openxmlformats.org/officeDocument/2006/relationships" xmlns:p="http://schemas.openxmlformats.org/presentationml/2006/main" type="title" preserve="1">
   <p:cSld name="Title Slide">
@@ -681,7 +766,7 @@
           <a:p>
             <a:fld id="{D296FE55-24A0-4405-87BA-F203EB2AA989}" type="datetimeFigureOut">
               <a:rPr lang="en-US" smtClean="0"/>
-              <a:t>11/26/2018</a:t>
+              <a:t>2/15/2019</a:t>
             </a:fld>
             <a:endParaRPr lang="en-US"/>
           </a:p>
@@ -851,7 +936,7 @@
           <a:p>
             <a:fld id="{D296FE55-24A0-4405-87BA-F203EB2AA989}" type="datetimeFigureOut">
               <a:rPr lang="en-US" smtClean="0"/>
-              <a:t>11/26/2018</a:t>
+              <a:t>2/15/2019</a:t>
             </a:fld>
             <a:endParaRPr lang="en-US"/>
           </a:p>
@@ -1031,7 +1116,7 @@
           <a:p>
             <a:fld id="{D296FE55-24A0-4405-87BA-F203EB2AA989}" type="datetimeFigureOut">
               <a:rPr lang="en-US" smtClean="0"/>
-              <a:t>11/26/2018</a:t>
+              <a:t>2/15/2019</a:t>
             </a:fld>
             <a:endParaRPr lang="en-US"/>
           </a:p>
@@ -1201,7 +1286,7 @@
           <a:p>
             <a:fld id="{D296FE55-24A0-4405-87BA-F203EB2AA989}" type="datetimeFigureOut">
               <a:rPr lang="en-US" smtClean="0"/>
-              <a:t>11/26/2018</a:t>
+              <a:t>2/15/2019</a:t>
             </a:fld>
             <a:endParaRPr lang="en-US"/>
           </a:p>
@@ -1445,7 +1530,7 @@
           <a:p>
             <a:fld id="{D296FE55-24A0-4405-87BA-F203EB2AA989}" type="datetimeFigureOut">
               <a:rPr lang="en-US" smtClean="0"/>
-              <a:t>11/26/2018</a:t>
+              <a:t>2/15/2019</a:t>
             </a:fld>
             <a:endParaRPr lang="en-US"/>
           </a:p>
@@ -1677,7 +1762,7 @@
           <a:p>
             <a:fld id="{D296FE55-24A0-4405-87BA-F203EB2AA989}" type="datetimeFigureOut">
               <a:rPr lang="en-US" smtClean="0"/>
-              <a:t>11/26/2018</a:t>
+              <a:t>2/15/2019</a:t>
             </a:fld>
             <a:endParaRPr lang="en-US"/>
           </a:p>
@@ -2044,7 +2129,7 @@
           <a:p>
             <a:fld id="{D296FE55-24A0-4405-87BA-F203EB2AA989}" type="datetimeFigureOut">
               <a:rPr lang="en-US" smtClean="0"/>
-              <a:t>11/26/2018</a:t>
+              <a:t>2/15/2019</a:t>
             </a:fld>
             <a:endParaRPr lang="en-US"/>
           </a:p>
@@ -2162,7 +2247,7 @@
           <a:p>
             <a:fld id="{D296FE55-24A0-4405-87BA-F203EB2AA989}" type="datetimeFigureOut">
               <a:rPr lang="en-US" smtClean="0"/>
-              <a:t>11/26/2018</a:t>
+              <a:t>2/15/2019</a:t>
             </a:fld>
             <a:endParaRPr lang="en-US"/>
           </a:p>
@@ -2257,7 +2342,7 @@
           <a:p>
             <a:fld id="{D296FE55-24A0-4405-87BA-F203EB2AA989}" type="datetimeFigureOut">
               <a:rPr lang="en-US" smtClean="0"/>
-              <a:t>11/26/2018</a:t>
+              <a:t>2/15/2019</a:t>
             </a:fld>
             <a:endParaRPr lang="en-US"/>
           </a:p>
@@ -2534,7 +2619,7 @@
           <a:p>
             <a:fld id="{D296FE55-24A0-4405-87BA-F203EB2AA989}" type="datetimeFigureOut">
               <a:rPr lang="en-US" smtClean="0"/>
-              <a:t>11/26/2018</a:t>
+              <a:t>2/15/2019</a:t>
             </a:fld>
             <a:endParaRPr lang="en-US"/>
           </a:p>
@@ -2791,7 +2876,7 @@
           <a:p>
             <a:fld id="{D296FE55-24A0-4405-87BA-F203EB2AA989}" type="datetimeFigureOut">
               <a:rPr lang="en-US" smtClean="0"/>
-              <a:t>11/26/2018</a:t>
+              <a:t>2/15/2019</a:t>
             </a:fld>
             <a:endParaRPr lang="en-US"/>
           </a:p>
@@ -3004,7 +3089,7 @@
           <a:p>
             <a:fld id="{D296FE55-24A0-4405-87BA-F203EB2AA989}" type="datetimeFigureOut">
               <a:rPr lang="en-US" smtClean="0"/>
-              <a:t>11/26/2018</a:t>
+              <a:t>2/15/2019</a:t>
             </a:fld>
             <a:endParaRPr lang="en-US"/>
           </a:p>
@@ -3409,6 +3494,164 @@
           <a:chExt cx="0" cy="0"/>
         </a:xfrm>
       </p:grpSpPr>
+      <p:sp>
+        <p:nvSpPr>
+          <p:cNvPr id="4" name="Rectangle: Rounded Corners 3">
+            <a:extLst>
+              <a:ext uri="{FF2B5EF4-FFF2-40B4-BE49-F238E27FC236}">
+                <a16:creationId xmlns:a16="http://schemas.microsoft.com/office/drawing/2014/main" id="{B62BA339-5EAE-4D57-AC42-FBBC03DD6CBD}"/>
+              </a:ext>
+            </a:extLst>
+          </p:cNvPr>
+          <p:cNvSpPr/>
+          <p:nvPr/>
+        </p:nvSpPr>
+        <p:spPr>
+          <a:xfrm>
+            <a:off x="2679403" y="2700670"/>
+            <a:ext cx="2743200" cy="2743200"/>
+          </a:xfrm>
+          <a:prstGeom prst="roundRect">
+            <a:avLst/>
+          </a:prstGeom>
+          <a:solidFill>
+            <a:schemeClr val="accent1">
+              <a:lumMod val="50000"/>
+            </a:schemeClr>
+          </a:solidFill>
+        </p:spPr>
+        <p:style>
+          <a:lnRef idx="2">
+            <a:schemeClr val="accent3">
+              <a:shade val="50000"/>
+            </a:schemeClr>
+          </a:lnRef>
+          <a:fillRef idx="1">
+            <a:schemeClr val="accent3"/>
+          </a:fillRef>
+          <a:effectRef idx="0">
+            <a:schemeClr val="accent3"/>
+          </a:effectRef>
+          <a:fontRef idx="minor">
+            <a:schemeClr val="lt1"/>
+          </a:fontRef>
+        </p:style>
+        <p:txBody>
+          <a:bodyPr rtlCol="0" anchor="ctr"/>
+          <a:lstStyle/>
+          <a:p>
+            <a:pPr algn="ctr"/>
+            <a:endParaRPr lang="en-US"/>
+          </a:p>
+        </p:txBody>
+      </p:sp>
+      <p:sp>
+        <p:nvSpPr>
+          <p:cNvPr id="2" name="Rectangle 1">
+            <a:extLst>
+              <a:ext uri="{FF2B5EF4-FFF2-40B4-BE49-F238E27FC236}">
+                <a16:creationId xmlns:a16="http://schemas.microsoft.com/office/drawing/2014/main" id="{870F85BD-5BF3-4906-B78E-493DEF507EB8}"/>
+              </a:ext>
+            </a:extLst>
+          </p:cNvPr>
+          <p:cNvSpPr/>
+          <p:nvPr/>
+        </p:nvSpPr>
+        <p:spPr>
+          <a:xfrm rot="18934506">
+            <a:off x="-222541" y="-194147"/>
+            <a:ext cx="4075155" cy="4216539"/>
+          </a:xfrm>
+          <a:prstGeom prst="rect">
+            <a:avLst/>
+          </a:prstGeom>
+          <a:noFill/>
+        </p:spPr>
+        <p:txBody>
+          <a:bodyPr wrap="none" lIns="91440" tIns="45720" rIns="91440" bIns="45720">
+            <a:spAutoFit/>
+          </a:bodyPr>
+          <a:lstStyle/>
+          <a:p>
+            <a:pPr algn="ctr"/>
+            <a:r>
+              <a:rPr lang="en-US" sz="26800" b="1" cap="none" spc="50" dirty="0">
+                <a:ln w="0"/>
+                <a:solidFill>
+                  <a:schemeClr val="accent1">
+                    <a:lumMod val="50000"/>
+                  </a:schemeClr>
+                </a:solidFill>
+                <a:latin typeface="Berlin Sans FB Demi" panose="020E0802020502020306" pitchFamily="34" charset="0"/>
+              </a:rPr>
+              <a:t>SIS</a:t>
+            </a:r>
+          </a:p>
+        </p:txBody>
+      </p:sp>
+      <p:sp>
+        <p:nvSpPr>
+          <p:cNvPr id="3" name="Rectangle 2">
+            <a:extLst>
+              <a:ext uri="{FF2B5EF4-FFF2-40B4-BE49-F238E27FC236}">
+                <a16:creationId xmlns:a16="http://schemas.microsoft.com/office/drawing/2014/main" id="{DE0E7472-FF05-4695-AC79-F9C407ACF7B5}"/>
+              </a:ext>
+            </a:extLst>
+          </p:cNvPr>
+          <p:cNvSpPr/>
+          <p:nvPr/>
+        </p:nvSpPr>
+        <p:spPr>
+          <a:xfrm>
+            <a:off x="3046782" y="2020455"/>
+            <a:ext cx="2029723" cy="3970318"/>
+          </a:xfrm>
+          <a:prstGeom prst="rect">
+            <a:avLst/>
+          </a:prstGeom>
+          <a:noFill/>
+        </p:spPr>
+        <p:txBody>
+          <a:bodyPr wrap="square" lIns="91440" tIns="45720" rIns="91440" bIns="45720">
+            <a:spAutoFit/>
+          </a:bodyPr>
+          <a:lstStyle/>
+          <a:p>
+            <a:pPr algn="ctr"/>
+            <a:r>
+              <a:rPr lang="en-US" sz="25200" b="1" spc="50" dirty="0">
+                <a:ln w="0"/>
+                <a:solidFill>
+                  <a:srgbClr val="FFC000"/>
+                </a:solidFill>
+                <a:effectLst>
+                  <a:innerShdw blurRad="63500" dist="50800" dir="13500000">
+                    <a:srgbClr val="000000">
+                      <a:alpha val="50000"/>
+                    </a:srgbClr>
+                  </a:innerShdw>
+                </a:effectLst>
+                <a:latin typeface="Bahnschrift" panose="020B0502040204020203" pitchFamily="34" charset="0"/>
+              </a:rPr>
+              <a:t>4</a:t>
+            </a:r>
+            <a:endParaRPr lang="en-US" sz="25200" b="1" cap="none" spc="50" dirty="0">
+              <a:ln w="0"/>
+              <a:solidFill>
+                <a:srgbClr val="FFC000"/>
+              </a:solidFill>
+              <a:effectLst>
+                <a:innerShdw blurRad="63500" dist="50800" dir="13500000">
+                  <a:srgbClr val="000000">
+                    <a:alpha val="50000"/>
+                  </a:srgbClr>
+                </a:innerShdw>
+              </a:effectLst>
+              <a:latin typeface="Bahnschrift" panose="020B0502040204020203" pitchFamily="34" charset="0"/>
+            </a:endParaRPr>
+          </a:p>
+        </p:txBody>
+      </p:sp>
     </p:spTree>
     <p:extLst>
       <p:ext uri="{BB962C8B-B14F-4D97-AF65-F5344CB8AC3E}">
@@ -3423,6 +3666,207 @@
 </file>
 
 <file path=ppt/slides/slide2.xml><?xml version="1.0" encoding="utf-8"?>
+<p:sld xmlns:a="http://schemas.openxmlformats.org/drawingml/2006/main" xmlns:r="http://schemas.openxmlformats.org/officeDocument/2006/relationships" xmlns:p="http://schemas.openxmlformats.org/presentationml/2006/main">
+  <p:cSld>
+    <p:spTree>
+      <p:nvGrpSpPr>
+        <p:cNvPr id="1" name=""/>
+        <p:cNvGrpSpPr/>
+        <p:nvPr/>
+      </p:nvGrpSpPr>
+      <p:grpSpPr>
+        <a:xfrm>
+          <a:off x="0" y="0"/>
+          <a:ext cx="0" cy="0"/>
+          <a:chOff x="0" y="0"/>
+          <a:chExt cx="0" cy="0"/>
+        </a:xfrm>
+      </p:grpSpPr>
+      <p:sp>
+        <p:nvSpPr>
+          <p:cNvPr id="4" name="Rectangle: Rounded Corners 3">
+            <a:extLst>
+              <a:ext uri="{FF2B5EF4-FFF2-40B4-BE49-F238E27FC236}">
+                <a16:creationId xmlns:a16="http://schemas.microsoft.com/office/drawing/2014/main" id="{B62BA339-5EAE-4D57-AC42-FBBC03DD6CBD}"/>
+              </a:ext>
+            </a:extLst>
+          </p:cNvPr>
+          <p:cNvSpPr/>
+          <p:nvPr/>
+        </p:nvSpPr>
+        <p:spPr>
+          <a:xfrm>
+            <a:off x="2679403" y="2700670"/>
+            <a:ext cx="2743200" cy="2743200"/>
+          </a:xfrm>
+          <a:prstGeom prst="roundRect">
+            <a:avLst/>
+          </a:prstGeom>
+          <a:solidFill>
+            <a:srgbClr val="FFC000"/>
+          </a:solidFill>
+          <a:ln>
+            <a:solidFill>
+              <a:schemeClr val="accent4">
+                <a:lumMod val="75000"/>
+              </a:schemeClr>
+            </a:solidFill>
+          </a:ln>
+        </p:spPr>
+        <p:style>
+          <a:lnRef idx="2">
+            <a:schemeClr val="accent3">
+              <a:shade val="50000"/>
+            </a:schemeClr>
+          </a:lnRef>
+          <a:fillRef idx="1">
+            <a:schemeClr val="accent3"/>
+          </a:fillRef>
+          <a:effectRef idx="0">
+            <a:schemeClr val="accent3"/>
+          </a:effectRef>
+          <a:fontRef idx="minor">
+            <a:schemeClr val="lt1"/>
+          </a:fontRef>
+        </p:style>
+        <p:txBody>
+          <a:bodyPr rtlCol="0" anchor="ctr"/>
+          <a:lstStyle/>
+          <a:p>
+            <a:pPr algn="ctr"/>
+            <a:endParaRPr lang="en-US"/>
+          </a:p>
+        </p:txBody>
+      </p:sp>
+      <p:sp>
+        <p:nvSpPr>
+          <p:cNvPr id="2" name="Rectangle 1">
+            <a:extLst>
+              <a:ext uri="{FF2B5EF4-FFF2-40B4-BE49-F238E27FC236}">
+                <a16:creationId xmlns:a16="http://schemas.microsoft.com/office/drawing/2014/main" id="{870F85BD-5BF3-4906-B78E-493DEF507EB8}"/>
+              </a:ext>
+            </a:extLst>
+          </p:cNvPr>
+          <p:cNvSpPr/>
+          <p:nvPr/>
+        </p:nvSpPr>
+        <p:spPr>
+          <a:xfrm rot="18934506">
+            <a:off x="-222541" y="-194147"/>
+            <a:ext cx="4075155" cy="4216539"/>
+          </a:xfrm>
+          <a:prstGeom prst="rect">
+            <a:avLst/>
+          </a:prstGeom>
+          <a:noFill/>
+        </p:spPr>
+        <p:txBody>
+          <a:bodyPr wrap="none" lIns="91440" tIns="45720" rIns="91440" bIns="45720">
+            <a:spAutoFit/>
+          </a:bodyPr>
+          <a:lstStyle/>
+          <a:p>
+            <a:pPr algn="ctr"/>
+            <a:r>
+              <a:rPr lang="en-US" sz="26800" b="1" cap="none" spc="50" dirty="0">
+                <a:ln w="0">
+                  <a:solidFill>
+                    <a:schemeClr val="accent4">
+                      <a:lumMod val="75000"/>
+                    </a:schemeClr>
+                  </a:solidFill>
+                </a:ln>
+                <a:solidFill>
+                  <a:srgbClr val="FFC000"/>
+                </a:solidFill>
+                <a:latin typeface="Berlin Sans FB Demi" panose="020E0802020502020306" pitchFamily="34" charset="0"/>
+              </a:rPr>
+              <a:t>SIS</a:t>
+            </a:r>
+          </a:p>
+        </p:txBody>
+      </p:sp>
+      <p:sp>
+        <p:nvSpPr>
+          <p:cNvPr id="3" name="Rectangle 2">
+            <a:extLst>
+              <a:ext uri="{FF2B5EF4-FFF2-40B4-BE49-F238E27FC236}">
+                <a16:creationId xmlns:a16="http://schemas.microsoft.com/office/drawing/2014/main" id="{DE0E7472-FF05-4695-AC79-F9C407ACF7B5}"/>
+              </a:ext>
+            </a:extLst>
+          </p:cNvPr>
+          <p:cNvSpPr/>
+          <p:nvPr/>
+        </p:nvSpPr>
+        <p:spPr>
+          <a:xfrm>
+            <a:off x="3089314" y="2031088"/>
+            <a:ext cx="2029723" cy="3970318"/>
+          </a:xfrm>
+          <a:prstGeom prst="rect">
+            <a:avLst/>
+          </a:prstGeom>
+          <a:noFill/>
+        </p:spPr>
+        <p:txBody>
+          <a:bodyPr wrap="square" lIns="91440" tIns="45720" rIns="91440" bIns="45720">
+            <a:spAutoFit/>
+          </a:bodyPr>
+          <a:lstStyle/>
+          <a:p>
+            <a:pPr algn="ctr"/>
+            <a:r>
+              <a:rPr lang="en-US" sz="25200" b="1" spc="50" dirty="0">
+                <a:ln w="0"/>
+                <a:solidFill>
+                  <a:schemeClr val="accent1">
+                    <a:lumMod val="50000"/>
+                  </a:schemeClr>
+                </a:solidFill>
+                <a:effectLst>
+                  <a:innerShdw blurRad="63500" dist="50800" dir="13500000">
+                    <a:srgbClr val="000000">
+                      <a:alpha val="50000"/>
+                    </a:srgbClr>
+                  </a:innerShdw>
+                </a:effectLst>
+                <a:latin typeface="Bahnschrift" panose="020B0502040204020203" pitchFamily="34" charset="0"/>
+              </a:rPr>
+              <a:t>5</a:t>
+            </a:r>
+            <a:endParaRPr lang="en-US" sz="25200" b="1" cap="none" spc="50" dirty="0">
+              <a:ln w="0"/>
+              <a:solidFill>
+                <a:schemeClr val="accent1">
+                  <a:lumMod val="50000"/>
+                </a:schemeClr>
+              </a:solidFill>
+              <a:effectLst>
+                <a:innerShdw blurRad="63500" dist="50800" dir="13500000">
+                  <a:srgbClr val="000000">
+                    <a:alpha val="50000"/>
+                  </a:srgbClr>
+                </a:innerShdw>
+              </a:effectLst>
+              <a:latin typeface="Bahnschrift" panose="020B0502040204020203" pitchFamily="34" charset="0"/>
+            </a:endParaRPr>
+          </a:p>
+        </p:txBody>
+      </p:sp>
+    </p:spTree>
+    <p:extLst>
+      <p:ext uri="{BB962C8B-B14F-4D97-AF65-F5344CB8AC3E}">
+        <p14:creationId xmlns:p14="http://schemas.microsoft.com/office/powerpoint/2010/main" val="2424508217"/>
+      </p:ext>
+    </p:extLst>
+  </p:cSld>
+  <p:clrMapOvr>
+    <a:masterClrMapping/>
+  </p:clrMapOvr>
+</p:sld>
+</file>
+
+<file path=ppt/slides/slide3.xml><?xml version="1.0" encoding="utf-8"?>
 <p:sld xmlns:a="http://schemas.openxmlformats.org/drawingml/2006/main" xmlns:r="http://schemas.openxmlformats.org/officeDocument/2006/relationships" xmlns:p="http://schemas.openxmlformats.org/presentationml/2006/main">
   <p:cSld>
     <p:spTree>
@@ -3543,7 +3987,7 @@
 </p:sld>
 </file>
 
-<file path=ppt/slides/slide3.xml><?xml version="1.0" encoding="utf-8"?>
+<file path=ppt/slides/slide4.xml><?xml version="1.0" encoding="utf-8"?>
 <p:sld xmlns:a="http://schemas.openxmlformats.org/drawingml/2006/main" xmlns:r="http://schemas.openxmlformats.org/officeDocument/2006/relationships" xmlns:p="http://schemas.openxmlformats.org/presentationml/2006/main">
   <p:cSld>
     <p:spTree>

</xml_diff>

<commit_message>
moved emulators to hyo2_kng + split of SIS listener
</commit_message>
<xml_diff>
--- a/resources/icons.pptx
+++ b/resources/icons.pptx
@@ -5,13 +5,11 @@
     <p:sldMasterId id="2147483672" r:id="rId1"/>
   </p:sldMasterIdLst>
   <p:notesMasterIdLst>
-    <p:notesMasterId r:id="rId6"/>
+    <p:notesMasterId r:id="rId4"/>
   </p:notesMasterIdLst>
   <p:sldIdLst>
-    <p:sldId id="318" r:id="rId2"/>
-    <p:sldId id="575" r:id="rId3"/>
-    <p:sldId id="388" r:id="rId4"/>
-    <p:sldId id="574" r:id="rId5"/>
+    <p:sldId id="388" r:id="rId2"/>
+    <p:sldId id="574" r:id="rId3"/>
   </p:sldIdLst>
   <p:sldSz cx="5486400" cy="5486400"/>
   <p:notesSz cx="6858000" cy="9144000"/>
@@ -200,7 +198,7 @@
           <a:p>
             <a:fld id="{173FD435-C119-4590-9D53-7CAF83F19020}" type="datetimeFigureOut">
               <a:rPr lang="en-US" smtClean="0"/>
-              <a:t>2/15/2019</a:t>
+              <a:t>2/17/2019</a:t>
             </a:fld>
             <a:endParaRPr lang="en-US"/>
           </a:p>
@@ -467,174 +465,6 @@
 </p:notesMaster>
 </file>
 
-<file path=ppt/notesSlides/notesSlide1.xml><?xml version="1.0" encoding="utf-8"?>
-<p:notes xmlns:a="http://schemas.openxmlformats.org/drawingml/2006/main" xmlns:r="http://schemas.openxmlformats.org/officeDocument/2006/relationships" xmlns:p="http://schemas.openxmlformats.org/presentationml/2006/main">
-  <p:cSld>
-    <p:spTree>
-      <p:nvGrpSpPr>
-        <p:cNvPr id="1" name=""/>
-        <p:cNvGrpSpPr/>
-        <p:nvPr/>
-      </p:nvGrpSpPr>
-      <p:grpSpPr>
-        <a:xfrm>
-          <a:off x="0" y="0"/>
-          <a:ext cx="0" cy="0"/>
-          <a:chOff x="0" y="0"/>
-          <a:chExt cx="0" cy="0"/>
-        </a:xfrm>
-      </p:grpSpPr>
-      <p:sp>
-        <p:nvSpPr>
-          <p:cNvPr id="2" name="Slide Image Placeholder 1"/>
-          <p:cNvSpPr>
-            <a:spLocks noGrp="1" noRot="1" noChangeAspect="1"/>
-          </p:cNvSpPr>
-          <p:nvPr>
-            <p:ph type="sldImg"/>
-          </p:nvPr>
-        </p:nvSpPr>
-        <p:spPr/>
-      </p:sp>
-      <p:sp>
-        <p:nvSpPr>
-          <p:cNvPr id="3" name="Notes Placeholder 2"/>
-          <p:cNvSpPr>
-            <a:spLocks noGrp="1"/>
-          </p:cNvSpPr>
-          <p:nvPr>
-            <p:ph type="body" idx="1"/>
-          </p:nvPr>
-        </p:nvSpPr>
-        <p:spPr/>
-        <p:txBody>
-          <a:bodyPr/>
-          <a:lstStyle/>
-          <a:p>
-            <a:endParaRPr lang="en-US" dirty="0"/>
-          </a:p>
-        </p:txBody>
-      </p:sp>
-      <p:sp>
-        <p:nvSpPr>
-          <p:cNvPr id="4" name="Slide Number Placeholder 3"/>
-          <p:cNvSpPr>
-            <a:spLocks noGrp="1"/>
-          </p:cNvSpPr>
-          <p:nvPr>
-            <p:ph type="sldNum" sz="quarter" idx="5"/>
-          </p:nvPr>
-        </p:nvSpPr>
-        <p:spPr/>
-        <p:txBody>
-          <a:bodyPr/>
-          <a:lstStyle/>
-          <a:p>
-            <a:fld id="{EE6CE23A-BB01-46B4-BDD6-2DE3EFA83C70}" type="slidenum">
-              <a:rPr lang="en-US" smtClean="0"/>
-              <a:t>1</a:t>
-            </a:fld>
-            <a:endParaRPr lang="en-US"/>
-          </a:p>
-        </p:txBody>
-      </p:sp>
-    </p:spTree>
-    <p:extLst>
-      <p:ext uri="{BB962C8B-B14F-4D97-AF65-F5344CB8AC3E}">
-        <p14:creationId xmlns:p14="http://schemas.microsoft.com/office/powerpoint/2010/main" val="1765517972"/>
-      </p:ext>
-    </p:extLst>
-  </p:cSld>
-  <p:clrMapOvr>
-    <a:masterClrMapping/>
-  </p:clrMapOvr>
-</p:notes>
-</file>
-
-<file path=ppt/notesSlides/notesSlide2.xml><?xml version="1.0" encoding="utf-8"?>
-<p:notes xmlns:a="http://schemas.openxmlformats.org/drawingml/2006/main" xmlns:r="http://schemas.openxmlformats.org/officeDocument/2006/relationships" xmlns:p="http://schemas.openxmlformats.org/presentationml/2006/main">
-  <p:cSld>
-    <p:spTree>
-      <p:nvGrpSpPr>
-        <p:cNvPr id="1" name=""/>
-        <p:cNvGrpSpPr/>
-        <p:nvPr/>
-      </p:nvGrpSpPr>
-      <p:grpSpPr>
-        <a:xfrm>
-          <a:off x="0" y="0"/>
-          <a:ext cx="0" cy="0"/>
-          <a:chOff x="0" y="0"/>
-          <a:chExt cx="0" cy="0"/>
-        </a:xfrm>
-      </p:grpSpPr>
-      <p:sp>
-        <p:nvSpPr>
-          <p:cNvPr id="2" name="Slide Image Placeholder 1"/>
-          <p:cNvSpPr>
-            <a:spLocks noGrp="1" noRot="1" noChangeAspect="1"/>
-          </p:cNvSpPr>
-          <p:nvPr>
-            <p:ph type="sldImg"/>
-          </p:nvPr>
-        </p:nvSpPr>
-        <p:spPr/>
-      </p:sp>
-      <p:sp>
-        <p:nvSpPr>
-          <p:cNvPr id="3" name="Notes Placeholder 2"/>
-          <p:cNvSpPr>
-            <a:spLocks noGrp="1"/>
-          </p:cNvSpPr>
-          <p:nvPr>
-            <p:ph type="body" idx="1"/>
-          </p:nvPr>
-        </p:nvSpPr>
-        <p:spPr/>
-        <p:txBody>
-          <a:bodyPr/>
-          <a:lstStyle/>
-          <a:p>
-            <a:endParaRPr lang="en-US" dirty="0"/>
-          </a:p>
-        </p:txBody>
-      </p:sp>
-      <p:sp>
-        <p:nvSpPr>
-          <p:cNvPr id="4" name="Slide Number Placeholder 3"/>
-          <p:cNvSpPr>
-            <a:spLocks noGrp="1"/>
-          </p:cNvSpPr>
-          <p:nvPr>
-            <p:ph type="sldNum" sz="quarter" idx="5"/>
-          </p:nvPr>
-        </p:nvSpPr>
-        <p:spPr/>
-        <p:txBody>
-          <a:bodyPr/>
-          <a:lstStyle/>
-          <a:p>
-            <a:fld id="{EE6CE23A-BB01-46B4-BDD6-2DE3EFA83C70}" type="slidenum">
-              <a:rPr lang="en-US" smtClean="0"/>
-              <a:t>2</a:t>
-            </a:fld>
-            <a:endParaRPr lang="en-US"/>
-          </a:p>
-        </p:txBody>
-      </p:sp>
-    </p:spTree>
-    <p:extLst>
-      <p:ext uri="{BB962C8B-B14F-4D97-AF65-F5344CB8AC3E}">
-        <p14:creationId xmlns:p14="http://schemas.microsoft.com/office/powerpoint/2010/main" val="999011433"/>
-      </p:ext>
-    </p:extLst>
-  </p:cSld>
-  <p:clrMapOvr>
-    <a:masterClrMapping/>
-  </p:clrMapOvr>
-</p:notes>
-</file>
-
 <file path=ppt/slideLayouts/slideLayout1.xml><?xml version="1.0" encoding="utf-8"?>
 <p:sldLayout xmlns:a="http://schemas.openxmlformats.org/drawingml/2006/main" xmlns:r="http://schemas.openxmlformats.org/officeDocument/2006/relationships" xmlns:p="http://schemas.openxmlformats.org/presentationml/2006/main" type="title" preserve="1">
   <p:cSld name="Title Slide">
@@ -766,7 +596,7 @@
           <a:p>
             <a:fld id="{D296FE55-24A0-4405-87BA-F203EB2AA989}" type="datetimeFigureOut">
               <a:rPr lang="en-US" smtClean="0"/>
-              <a:t>2/15/2019</a:t>
+              <a:t>2/17/2019</a:t>
             </a:fld>
             <a:endParaRPr lang="en-US"/>
           </a:p>
@@ -936,7 +766,7 @@
           <a:p>
             <a:fld id="{D296FE55-24A0-4405-87BA-F203EB2AA989}" type="datetimeFigureOut">
               <a:rPr lang="en-US" smtClean="0"/>
-              <a:t>2/15/2019</a:t>
+              <a:t>2/17/2019</a:t>
             </a:fld>
             <a:endParaRPr lang="en-US"/>
           </a:p>
@@ -1116,7 +946,7 @@
           <a:p>
             <a:fld id="{D296FE55-24A0-4405-87BA-F203EB2AA989}" type="datetimeFigureOut">
               <a:rPr lang="en-US" smtClean="0"/>
-              <a:t>2/15/2019</a:t>
+              <a:t>2/17/2019</a:t>
             </a:fld>
             <a:endParaRPr lang="en-US"/>
           </a:p>
@@ -1286,7 +1116,7 @@
           <a:p>
             <a:fld id="{D296FE55-24A0-4405-87BA-F203EB2AA989}" type="datetimeFigureOut">
               <a:rPr lang="en-US" smtClean="0"/>
-              <a:t>2/15/2019</a:t>
+              <a:t>2/17/2019</a:t>
             </a:fld>
             <a:endParaRPr lang="en-US"/>
           </a:p>
@@ -1530,7 +1360,7 @@
           <a:p>
             <a:fld id="{D296FE55-24A0-4405-87BA-F203EB2AA989}" type="datetimeFigureOut">
               <a:rPr lang="en-US" smtClean="0"/>
-              <a:t>2/15/2019</a:t>
+              <a:t>2/17/2019</a:t>
             </a:fld>
             <a:endParaRPr lang="en-US"/>
           </a:p>
@@ -1762,7 +1592,7 @@
           <a:p>
             <a:fld id="{D296FE55-24A0-4405-87BA-F203EB2AA989}" type="datetimeFigureOut">
               <a:rPr lang="en-US" smtClean="0"/>
-              <a:t>2/15/2019</a:t>
+              <a:t>2/17/2019</a:t>
             </a:fld>
             <a:endParaRPr lang="en-US"/>
           </a:p>
@@ -2129,7 +1959,7 @@
           <a:p>
             <a:fld id="{D296FE55-24A0-4405-87BA-F203EB2AA989}" type="datetimeFigureOut">
               <a:rPr lang="en-US" smtClean="0"/>
-              <a:t>2/15/2019</a:t>
+              <a:t>2/17/2019</a:t>
             </a:fld>
             <a:endParaRPr lang="en-US"/>
           </a:p>
@@ -2247,7 +2077,7 @@
           <a:p>
             <a:fld id="{D296FE55-24A0-4405-87BA-F203EB2AA989}" type="datetimeFigureOut">
               <a:rPr lang="en-US" smtClean="0"/>
-              <a:t>2/15/2019</a:t>
+              <a:t>2/17/2019</a:t>
             </a:fld>
             <a:endParaRPr lang="en-US"/>
           </a:p>
@@ -2342,7 +2172,7 @@
           <a:p>
             <a:fld id="{D296FE55-24A0-4405-87BA-F203EB2AA989}" type="datetimeFigureOut">
               <a:rPr lang="en-US" smtClean="0"/>
-              <a:t>2/15/2019</a:t>
+              <a:t>2/17/2019</a:t>
             </a:fld>
             <a:endParaRPr lang="en-US"/>
           </a:p>
@@ -2619,7 +2449,7 @@
           <a:p>
             <a:fld id="{D296FE55-24A0-4405-87BA-F203EB2AA989}" type="datetimeFigureOut">
               <a:rPr lang="en-US" smtClean="0"/>
-              <a:t>2/15/2019</a:t>
+              <a:t>2/17/2019</a:t>
             </a:fld>
             <a:endParaRPr lang="en-US"/>
           </a:p>
@@ -2876,7 +2706,7 @@
           <a:p>
             <a:fld id="{D296FE55-24A0-4405-87BA-F203EB2AA989}" type="datetimeFigureOut">
               <a:rPr lang="en-US" smtClean="0"/>
-              <a:t>2/15/2019</a:t>
+              <a:t>2/17/2019</a:t>
             </a:fld>
             <a:endParaRPr lang="en-US"/>
           </a:p>
@@ -3089,7 +2919,7 @@
           <a:p>
             <a:fld id="{D296FE55-24A0-4405-87BA-F203EB2AA989}" type="datetimeFigureOut">
               <a:rPr lang="en-US" smtClean="0"/>
-              <a:t>2/15/2019</a:t>
+              <a:t>2/17/2019</a:t>
             </a:fld>
             <a:endParaRPr lang="en-US"/>
           </a:p>
@@ -3496,395 +3326,6 @@
       </p:grpSpPr>
       <p:sp>
         <p:nvSpPr>
-          <p:cNvPr id="4" name="Rectangle: Rounded Corners 3">
-            <a:extLst>
-              <a:ext uri="{FF2B5EF4-FFF2-40B4-BE49-F238E27FC236}">
-                <a16:creationId xmlns:a16="http://schemas.microsoft.com/office/drawing/2014/main" id="{B62BA339-5EAE-4D57-AC42-FBBC03DD6CBD}"/>
-              </a:ext>
-            </a:extLst>
-          </p:cNvPr>
-          <p:cNvSpPr/>
-          <p:nvPr/>
-        </p:nvSpPr>
-        <p:spPr>
-          <a:xfrm>
-            <a:off x="2679403" y="2700670"/>
-            <a:ext cx="2743200" cy="2743200"/>
-          </a:xfrm>
-          <a:prstGeom prst="roundRect">
-            <a:avLst/>
-          </a:prstGeom>
-          <a:solidFill>
-            <a:schemeClr val="accent1">
-              <a:lumMod val="50000"/>
-            </a:schemeClr>
-          </a:solidFill>
-        </p:spPr>
-        <p:style>
-          <a:lnRef idx="2">
-            <a:schemeClr val="accent3">
-              <a:shade val="50000"/>
-            </a:schemeClr>
-          </a:lnRef>
-          <a:fillRef idx="1">
-            <a:schemeClr val="accent3"/>
-          </a:fillRef>
-          <a:effectRef idx="0">
-            <a:schemeClr val="accent3"/>
-          </a:effectRef>
-          <a:fontRef idx="minor">
-            <a:schemeClr val="lt1"/>
-          </a:fontRef>
-        </p:style>
-        <p:txBody>
-          <a:bodyPr rtlCol="0" anchor="ctr"/>
-          <a:lstStyle/>
-          <a:p>
-            <a:pPr algn="ctr"/>
-            <a:endParaRPr lang="en-US"/>
-          </a:p>
-        </p:txBody>
-      </p:sp>
-      <p:sp>
-        <p:nvSpPr>
-          <p:cNvPr id="2" name="Rectangle 1">
-            <a:extLst>
-              <a:ext uri="{FF2B5EF4-FFF2-40B4-BE49-F238E27FC236}">
-                <a16:creationId xmlns:a16="http://schemas.microsoft.com/office/drawing/2014/main" id="{870F85BD-5BF3-4906-B78E-493DEF507EB8}"/>
-              </a:ext>
-            </a:extLst>
-          </p:cNvPr>
-          <p:cNvSpPr/>
-          <p:nvPr/>
-        </p:nvSpPr>
-        <p:spPr>
-          <a:xfrm rot="18934506">
-            <a:off x="-222541" y="-194147"/>
-            <a:ext cx="4075155" cy="4216539"/>
-          </a:xfrm>
-          <a:prstGeom prst="rect">
-            <a:avLst/>
-          </a:prstGeom>
-          <a:noFill/>
-        </p:spPr>
-        <p:txBody>
-          <a:bodyPr wrap="none" lIns="91440" tIns="45720" rIns="91440" bIns="45720">
-            <a:spAutoFit/>
-          </a:bodyPr>
-          <a:lstStyle/>
-          <a:p>
-            <a:pPr algn="ctr"/>
-            <a:r>
-              <a:rPr lang="en-US" sz="26800" b="1" cap="none" spc="50" dirty="0">
-                <a:ln w="0"/>
-                <a:solidFill>
-                  <a:schemeClr val="accent1">
-                    <a:lumMod val="50000"/>
-                  </a:schemeClr>
-                </a:solidFill>
-                <a:latin typeface="Berlin Sans FB Demi" panose="020E0802020502020306" pitchFamily="34" charset="0"/>
-              </a:rPr>
-              <a:t>SIS</a:t>
-            </a:r>
-          </a:p>
-        </p:txBody>
-      </p:sp>
-      <p:sp>
-        <p:nvSpPr>
-          <p:cNvPr id="3" name="Rectangle 2">
-            <a:extLst>
-              <a:ext uri="{FF2B5EF4-FFF2-40B4-BE49-F238E27FC236}">
-                <a16:creationId xmlns:a16="http://schemas.microsoft.com/office/drawing/2014/main" id="{DE0E7472-FF05-4695-AC79-F9C407ACF7B5}"/>
-              </a:ext>
-            </a:extLst>
-          </p:cNvPr>
-          <p:cNvSpPr/>
-          <p:nvPr/>
-        </p:nvSpPr>
-        <p:spPr>
-          <a:xfrm>
-            <a:off x="3046782" y="2020455"/>
-            <a:ext cx="2029723" cy="3970318"/>
-          </a:xfrm>
-          <a:prstGeom prst="rect">
-            <a:avLst/>
-          </a:prstGeom>
-          <a:noFill/>
-        </p:spPr>
-        <p:txBody>
-          <a:bodyPr wrap="square" lIns="91440" tIns="45720" rIns="91440" bIns="45720">
-            <a:spAutoFit/>
-          </a:bodyPr>
-          <a:lstStyle/>
-          <a:p>
-            <a:pPr algn="ctr"/>
-            <a:r>
-              <a:rPr lang="en-US" sz="25200" b="1" spc="50" dirty="0">
-                <a:ln w="0"/>
-                <a:solidFill>
-                  <a:srgbClr val="FFC000"/>
-                </a:solidFill>
-                <a:effectLst>
-                  <a:innerShdw blurRad="63500" dist="50800" dir="13500000">
-                    <a:srgbClr val="000000">
-                      <a:alpha val="50000"/>
-                    </a:srgbClr>
-                  </a:innerShdw>
-                </a:effectLst>
-                <a:latin typeface="Bahnschrift" panose="020B0502040204020203" pitchFamily="34" charset="0"/>
-              </a:rPr>
-              <a:t>4</a:t>
-            </a:r>
-            <a:endParaRPr lang="en-US" sz="25200" b="1" cap="none" spc="50" dirty="0">
-              <a:ln w="0"/>
-              <a:solidFill>
-                <a:srgbClr val="FFC000"/>
-              </a:solidFill>
-              <a:effectLst>
-                <a:innerShdw blurRad="63500" dist="50800" dir="13500000">
-                  <a:srgbClr val="000000">
-                    <a:alpha val="50000"/>
-                  </a:srgbClr>
-                </a:innerShdw>
-              </a:effectLst>
-              <a:latin typeface="Bahnschrift" panose="020B0502040204020203" pitchFamily="34" charset="0"/>
-            </a:endParaRPr>
-          </a:p>
-        </p:txBody>
-      </p:sp>
-    </p:spTree>
-    <p:extLst>
-      <p:ext uri="{BB962C8B-B14F-4D97-AF65-F5344CB8AC3E}">
-        <p14:creationId xmlns:p14="http://schemas.microsoft.com/office/powerpoint/2010/main" val="2127505850"/>
-      </p:ext>
-    </p:extLst>
-  </p:cSld>
-  <p:clrMapOvr>
-    <a:masterClrMapping/>
-  </p:clrMapOvr>
-</p:sld>
-</file>
-
-<file path=ppt/slides/slide2.xml><?xml version="1.0" encoding="utf-8"?>
-<p:sld xmlns:a="http://schemas.openxmlformats.org/drawingml/2006/main" xmlns:r="http://schemas.openxmlformats.org/officeDocument/2006/relationships" xmlns:p="http://schemas.openxmlformats.org/presentationml/2006/main">
-  <p:cSld>
-    <p:spTree>
-      <p:nvGrpSpPr>
-        <p:cNvPr id="1" name=""/>
-        <p:cNvGrpSpPr/>
-        <p:nvPr/>
-      </p:nvGrpSpPr>
-      <p:grpSpPr>
-        <a:xfrm>
-          <a:off x="0" y="0"/>
-          <a:ext cx="0" cy="0"/>
-          <a:chOff x="0" y="0"/>
-          <a:chExt cx="0" cy="0"/>
-        </a:xfrm>
-      </p:grpSpPr>
-      <p:sp>
-        <p:nvSpPr>
-          <p:cNvPr id="4" name="Rectangle: Rounded Corners 3">
-            <a:extLst>
-              <a:ext uri="{FF2B5EF4-FFF2-40B4-BE49-F238E27FC236}">
-                <a16:creationId xmlns:a16="http://schemas.microsoft.com/office/drawing/2014/main" id="{B62BA339-5EAE-4D57-AC42-FBBC03DD6CBD}"/>
-              </a:ext>
-            </a:extLst>
-          </p:cNvPr>
-          <p:cNvSpPr/>
-          <p:nvPr/>
-        </p:nvSpPr>
-        <p:spPr>
-          <a:xfrm>
-            <a:off x="2679403" y="2700670"/>
-            <a:ext cx="2743200" cy="2743200"/>
-          </a:xfrm>
-          <a:prstGeom prst="roundRect">
-            <a:avLst/>
-          </a:prstGeom>
-          <a:solidFill>
-            <a:srgbClr val="FFC000"/>
-          </a:solidFill>
-          <a:ln>
-            <a:solidFill>
-              <a:schemeClr val="accent4">
-                <a:lumMod val="75000"/>
-              </a:schemeClr>
-            </a:solidFill>
-          </a:ln>
-        </p:spPr>
-        <p:style>
-          <a:lnRef idx="2">
-            <a:schemeClr val="accent3">
-              <a:shade val="50000"/>
-            </a:schemeClr>
-          </a:lnRef>
-          <a:fillRef idx="1">
-            <a:schemeClr val="accent3"/>
-          </a:fillRef>
-          <a:effectRef idx="0">
-            <a:schemeClr val="accent3"/>
-          </a:effectRef>
-          <a:fontRef idx="minor">
-            <a:schemeClr val="lt1"/>
-          </a:fontRef>
-        </p:style>
-        <p:txBody>
-          <a:bodyPr rtlCol="0" anchor="ctr"/>
-          <a:lstStyle/>
-          <a:p>
-            <a:pPr algn="ctr"/>
-            <a:endParaRPr lang="en-US"/>
-          </a:p>
-        </p:txBody>
-      </p:sp>
-      <p:sp>
-        <p:nvSpPr>
-          <p:cNvPr id="2" name="Rectangle 1">
-            <a:extLst>
-              <a:ext uri="{FF2B5EF4-FFF2-40B4-BE49-F238E27FC236}">
-                <a16:creationId xmlns:a16="http://schemas.microsoft.com/office/drawing/2014/main" id="{870F85BD-5BF3-4906-B78E-493DEF507EB8}"/>
-              </a:ext>
-            </a:extLst>
-          </p:cNvPr>
-          <p:cNvSpPr/>
-          <p:nvPr/>
-        </p:nvSpPr>
-        <p:spPr>
-          <a:xfrm rot="18934506">
-            <a:off x="-222541" y="-194147"/>
-            <a:ext cx="4075155" cy="4216539"/>
-          </a:xfrm>
-          <a:prstGeom prst="rect">
-            <a:avLst/>
-          </a:prstGeom>
-          <a:noFill/>
-        </p:spPr>
-        <p:txBody>
-          <a:bodyPr wrap="none" lIns="91440" tIns="45720" rIns="91440" bIns="45720">
-            <a:spAutoFit/>
-          </a:bodyPr>
-          <a:lstStyle/>
-          <a:p>
-            <a:pPr algn="ctr"/>
-            <a:r>
-              <a:rPr lang="en-US" sz="26800" b="1" cap="none" spc="50" dirty="0">
-                <a:ln w="0">
-                  <a:solidFill>
-                    <a:schemeClr val="accent4">
-                      <a:lumMod val="75000"/>
-                    </a:schemeClr>
-                  </a:solidFill>
-                </a:ln>
-                <a:solidFill>
-                  <a:srgbClr val="FFC000"/>
-                </a:solidFill>
-                <a:latin typeface="Berlin Sans FB Demi" panose="020E0802020502020306" pitchFamily="34" charset="0"/>
-              </a:rPr>
-              <a:t>SIS</a:t>
-            </a:r>
-          </a:p>
-        </p:txBody>
-      </p:sp>
-      <p:sp>
-        <p:nvSpPr>
-          <p:cNvPr id="3" name="Rectangle 2">
-            <a:extLst>
-              <a:ext uri="{FF2B5EF4-FFF2-40B4-BE49-F238E27FC236}">
-                <a16:creationId xmlns:a16="http://schemas.microsoft.com/office/drawing/2014/main" id="{DE0E7472-FF05-4695-AC79-F9C407ACF7B5}"/>
-              </a:ext>
-            </a:extLst>
-          </p:cNvPr>
-          <p:cNvSpPr/>
-          <p:nvPr/>
-        </p:nvSpPr>
-        <p:spPr>
-          <a:xfrm>
-            <a:off x="3089314" y="2031088"/>
-            <a:ext cx="2029723" cy="3970318"/>
-          </a:xfrm>
-          <a:prstGeom prst="rect">
-            <a:avLst/>
-          </a:prstGeom>
-          <a:noFill/>
-        </p:spPr>
-        <p:txBody>
-          <a:bodyPr wrap="square" lIns="91440" tIns="45720" rIns="91440" bIns="45720">
-            <a:spAutoFit/>
-          </a:bodyPr>
-          <a:lstStyle/>
-          <a:p>
-            <a:pPr algn="ctr"/>
-            <a:r>
-              <a:rPr lang="en-US" sz="25200" b="1" spc="50" dirty="0">
-                <a:ln w="0"/>
-                <a:solidFill>
-                  <a:schemeClr val="accent1">
-                    <a:lumMod val="50000"/>
-                  </a:schemeClr>
-                </a:solidFill>
-                <a:effectLst>
-                  <a:innerShdw blurRad="63500" dist="50800" dir="13500000">
-                    <a:srgbClr val="000000">
-                      <a:alpha val="50000"/>
-                    </a:srgbClr>
-                  </a:innerShdw>
-                </a:effectLst>
-                <a:latin typeface="Bahnschrift" panose="020B0502040204020203" pitchFamily="34" charset="0"/>
-              </a:rPr>
-              <a:t>5</a:t>
-            </a:r>
-            <a:endParaRPr lang="en-US" sz="25200" b="1" cap="none" spc="50" dirty="0">
-              <a:ln w="0"/>
-              <a:solidFill>
-                <a:schemeClr val="accent1">
-                  <a:lumMod val="50000"/>
-                </a:schemeClr>
-              </a:solidFill>
-              <a:effectLst>
-                <a:innerShdw blurRad="63500" dist="50800" dir="13500000">
-                  <a:srgbClr val="000000">
-                    <a:alpha val="50000"/>
-                  </a:srgbClr>
-                </a:innerShdw>
-              </a:effectLst>
-              <a:latin typeface="Bahnschrift" panose="020B0502040204020203" pitchFamily="34" charset="0"/>
-            </a:endParaRPr>
-          </a:p>
-        </p:txBody>
-      </p:sp>
-    </p:spTree>
-    <p:extLst>
-      <p:ext uri="{BB962C8B-B14F-4D97-AF65-F5344CB8AC3E}">
-        <p14:creationId xmlns:p14="http://schemas.microsoft.com/office/powerpoint/2010/main" val="2424508217"/>
-      </p:ext>
-    </p:extLst>
-  </p:cSld>
-  <p:clrMapOvr>
-    <a:masterClrMapping/>
-  </p:clrMapOvr>
-</p:sld>
-</file>
-
-<file path=ppt/slides/slide3.xml><?xml version="1.0" encoding="utf-8"?>
-<p:sld xmlns:a="http://schemas.openxmlformats.org/drawingml/2006/main" xmlns:r="http://schemas.openxmlformats.org/officeDocument/2006/relationships" xmlns:p="http://schemas.openxmlformats.org/presentationml/2006/main">
-  <p:cSld>
-    <p:spTree>
-      <p:nvGrpSpPr>
-        <p:cNvPr id="1" name=""/>
-        <p:cNvGrpSpPr/>
-        <p:nvPr/>
-      </p:nvGrpSpPr>
-      <p:grpSpPr>
-        <a:xfrm>
-          <a:off x="0" y="0"/>
-          <a:ext cx="0" cy="0"/>
-          <a:chOff x="0" y="0"/>
-          <a:chExt cx="0" cy="0"/>
-        </a:xfrm>
-      </p:grpSpPr>
-      <p:sp>
-        <p:nvSpPr>
           <p:cNvPr id="4" name="Oval 3"/>
           <p:cNvSpPr/>
           <p:nvPr/>
@@ -3987,7 +3428,7 @@
 </p:sld>
 </file>
 
-<file path=ppt/slides/slide4.xml><?xml version="1.0" encoding="utf-8"?>
+<file path=ppt/slides/slide2.xml><?xml version="1.0" encoding="utf-8"?>
 <p:sld xmlns:a="http://schemas.openxmlformats.org/drawingml/2006/main" xmlns:r="http://schemas.openxmlformats.org/officeDocument/2006/relationships" xmlns:p="http://schemas.openxmlformats.org/presentationml/2006/main">
   <p:cSld>
     <p:spTree>

</xml_diff>

<commit_message>
added creation of constant-gradient profile
</commit_message>
<xml_diff>
--- a/resources/icons.pptx
+++ b/resources/icons.pptx
@@ -198,7 +198,7 @@
           <a:p>
             <a:fld id="{173FD435-C119-4590-9D53-7CAF83F19020}" type="datetimeFigureOut">
               <a:rPr lang="en-US" smtClean="0"/>
-              <a:t>2/17/2019</a:t>
+              <a:t>4/30/2019</a:t>
             </a:fld>
             <a:endParaRPr lang="en-US"/>
           </a:p>
@@ -596,7 +596,7 @@
           <a:p>
             <a:fld id="{D296FE55-24A0-4405-87BA-F203EB2AA989}" type="datetimeFigureOut">
               <a:rPr lang="en-US" smtClean="0"/>
-              <a:t>2/17/2019</a:t>
+              <a:t>4/30/2019</a:t>
             </a:fld>
             <a:endParaRPr lang="en-US"/>
           </a:p>
@@ -766,7 +766,7 @@
           <a:p>
             <a:fld id="{D296FE55-24A0-4405-87BA-F203EB2AA989}" type="datetimeFigureOut">
               <a:rPr lang="en-US" smtClean="0"/>
-              <a:t>2/17/2019</a:t>
+              <a:t>4/30/2019</a:t>
             </a:fld>
             <a:endParaRPr lang="en-US"/>
           </a:p>
@@ -946,7 +946,7 @@
           <a:p>
             <a:fld id="{D296FE55-24A0-4405-87BA-F203EB2AA989}" type="datetimeFigureOut">
               <a:rPr lang="en-US" smtClean="0"/>
-              <a:t>2/17/2019</a:t>
+              <a:t>4/30/2019</a:t>
             </a:fld>
             <a:endParaRPr lang="en-US"/>
           </a:p>
@@ -1116,7 +1116,7 @@
           <a:p>
             <a:fld id="{D296FE55-24A0-4405-87BA-F203EB2AA989}" type="datetimeFigureOut">
               <a:rPr lang="en-US" smtClean="0"/>
-              <a:t>2/17/2019</a:t>
+              <a:t>4/30/2019</a:t>
             </a:fld>
             <a:endParaRPr lang="en-US"/>
           </a:p>
@@ -1360,7 +1360,7 @@
           <a:p>
             <a:fld id="{D296FE55-24A0-4405-87BA-F203EB2AA989}" type="datetimeFigureOut">
               <a:rPr lang="en-US" smtClean="0"/>
-              <a:t>2/17/2019</a:t>
+              <a:t>4/30/2019</a:t>
             </a:fld>
             <a:endParaRPr lang="en-US"/>
           </a:p>
@@ -1592,7 +1592,7 @@
           <a:p>
             <a:fld id="{D296FE55-24A0-4405-87BA-F203EB2AA989}" type="datetimeFigureOut">
               <a:rPr lang="en-US" smtClean="0"/>
-              <a:t>2/17/2019</a:t>
+              <a:t>4/30/2019</a:t>
             </a:fld>
             <a:endParaRPr lang="en-US"/>
           </a:p>
@@ -1959,7 +1959,7 @@
           <a:p>
             <a:fld id="{D296FE55-24A0-4405-87BA-F203EB2AA989}" type="datetimeFigureOut">
               <a:rPr lang="en-US" smtClean="0"/>
-              <a:t>2/17/2019</a:t>
+              <a:t>4/30/2019</a:t>
             </a:fld>
             <a:endParaRPr lang="en-US"/>
           </a:p>
@@ -2077,7 +2077,7 @@
           <a:p>
             <a:fld id="{D296FE55-24A0-4405-87BA-F203EB2AA989}" type="datetimeFigureOut">
               <a:rPr lang="en-US" smtClean="0"/>
-              <a:t>2/17/2019</a:t>
+              <a:t>4/30/2019</a:t>
             </a:fld>
             <a:endParaRPr lang="en-US"/>
           </a:p>
@@ -2172,7 +2172,7 @@
           <a:p>
             <a:fld id="{D296FE55-24A0-4405-87BA-F203EB2AA989}" type="datetimeFigureOut">
               <a:rPr lang="en-US" smtClean="0"/>
-              <a:t>2/17/2019</a:t>
+              <a:t>4/30/2019</a:t>
             </a:fld>
             <a:endParaRPr lang="en-US"/>
           </a:p>
@@ -2449,7 +2449,7 @@
           <a:p>
             <a:fld id="{D296FE55-24A0-4405-87BA-F203EB2AA989}" type="datetimeFigureOut">
               <a:rPr lang="en-US" smtClean="0"/>
-              <a:t>2/17/2019</a:t>
+              <a:t>4/30/2019</a:t>
             </a:fld>
             <a:endParaRPr lang="en-US"/>
           </a:p>
@@ -2706,7 +2706,7 @@
           <a:p>
             <a:fld id="{D296FE55-24A0-4405-87BA-F203EB2AA989}" type="datetimeFigureOut">
               <a:rPr lang="en-US" smtClean="0"/>
-              <a:t>2/17/2019</a:t>
+              <a:t>4/30/2019</a:t>
             </a:fld>
             <a:endParaRPr lang="en-US"/>
           </a:p>
@@ -2919,7 +2919,7 @@
           <a:p>
             <a:fld id="{D296FE55-24A0-4405-87BA-F203EB2AA989}" type="datetimeFigureOut">
               <a:rPr lang="en-US" smtClean="0"/>
-              <a:t>2/17/2019</a:t>
+              <a:t>4/30/2019</a:t>
             </a:fld>
             <a:endParaRPr lang="en-US"/>
           </a:p>

</xml_diff>

<commit_message>
added initial work for SSM_SIS utility app
</commit_message>
<xml_diff>
--- a/resources/icons.pptx
+++ b/resources/icons.pptx
@@ -5,11 +5,12 @@
     <p:sldMasterId id="2147483672" r:id="rId1"/>
   </p:sldMasterIdLst>
   <p:notesMasterIdLst>
-    <p:notesMasterId r:id="rId4"/>
+    <p:notesMasterId r:id="rId5"/>
   </p:notesMasterIdLst>
   <p:sldIdLst>
     <p:sldId id="388" r:id="rId2"/>
     <p:sldId id="574" r:id="rId3"/>
+    <p:sldId id="575" r:id="rId4"/>
   </p:sldIdLst>
   <p:sldSz cx="5486400" cy="5486400"/>
   <p:notesSz cx="6858000" cy="9144000"/>
@@ -198,7 +199,7 @@
           <a:p>
             <a:fld id="{173FD435-C119-4590-9D53-7CAF83F19020}" type="datetimeFigureOut">
               <a:rPr lang="en-US" smtClean="0"/>
-              <a:t>4/30/2019</a:t>
+              <a:t>4/4/2021</a:t>
             </a:fld>
             <a:endParaRPr lang="en-US"/>
           </a:p>
@@ -596,7 +597,7 @@
           <a:p>
             <a:fld id="{D296FE55-24A0-4405-87BA-F203EB2AA989}" type="datetimeFigureOut">
               <a:rPr lang="en-US" smtClean="0"/>
-              <a:t>4/30/2019</a:t>
+              <a:t>4/4/2021</a:t>
             </a:fld>
             <a:endParaRPr lang="en-US"/>
           </a:p>
@@ -766,7 +767,7 @@
           <a:p>
             <a:fld id="{D296FE55-24A0-4405-87BA-F203EB2AA989}" type="datetimeFigureOut">
               <a:rPr lang="en-US" smtClean="0"/>
-              <a:t>4/30/2019</a:t>
+              <a:t>4/4/2021</a:t>
             </a:fld>
             <a:endParaRPr lang="en-US"/>
           </a:p>
@@ -946,7 +947,7 @@
           <a:p>
             <a:fld id="{D296FE55-24A0-4405-87BA-F203EB2AA989}" type="datetimeFigureOut">
               <a:rPr lang="en-US" smtClean="0"/>
-              <a:t>4/30/2019</a:t>
+              <a:t>4/4/2021</a:t>
             </a:fld>
             <a:endParaRPr lang="en-US"/>
           </a:p>
@@ -1116,7 +1117,7 @@
           <a:p>
             <a:fld id="{D296FE55-24A0-4405-87BA-F203EB2AA989}" type="datetimeFigureOut">
               <a:rPr lang="en-US" smtClean="0"/>
-              <a:t>4/30/2019</a:t>
+              <a:t>4/4/2021</a:t>
             </a:fld>
             <a:endParaRPr lang="en-US"/>
           </a:p>
@@ -1360,7 +1361,7 @@
           <a:p>
             <a:fld id="{D296FE55-24A0-4405-87BA-F203EB2AA989}" type="datetimeFigureOut">
               <a:rPr lang="en-US" smtClean="0"/>
-              <a:t>4/30/2019</a:t>
+              <a:t>4/4/2021</a:t>
             </a:fld>
             <a:endParaRPr lang="en-US"/>
           </a:p>
@@ -1592,7 +1593,7 @@
           <a:p>
             <a:fld id="{D296FE55-24A0-4405-87BA-F203EB2AA989}" type="datetimeFigureOut">
               <a:rPr lang="en-US" smtClean="0"/>
-              <a:t>4/30/2019</a:t>
+              <a:t>4/4/2021</a:t>
             </a:fld>
             <a:endParaRPr lang="en-US"/>
           </a:p>
@@ -1959,7 +1960,7 @@
           <a:p>
             <a:fld id="{D296FE55-24A0-4405-87BA-F203EB2AA989}" type="datetimeFigureOut">
               <a:rPr lang="en-US" smtClean="0"/>
-              <a:t>4/30/2019</a:t>
+              <a:t>4/4/2021</a:t>
             </a:fld>
             <a:endParaRPr lang="en-US"/>
           </a:p>
@@ -2077,7 +2078,7 @@
           <a:p>
             <a:fld id="{D296FE55-24A0-4405-87BA-F203EB2AA989}" type="datetimeFigureOut">
               <a:rPr lang="en-US" smtClean="0"/>
-              <a:t>4/30/2019</a:t>
+              <a:t>4/4/2021</a:t>
             </a:fld>
             <a:endParaRPr lang="en-US"/>
           </a:p>
@@ -2172,7 +2173,7 @@
           <a:p>
             <a:fld id="{D296FE55-24A0-4405-87BA-F203EB2AA989}" type="datetimeFigureOut">
               <a:rPr lang="en-US" smtClean="0"/>
-              <a:t>4/30/2019</a:t>
+              <a:t>4/4/2021</a:t>
             </a:fld>
             <a:endParaRPr lang="en-US"/>
           </a:p>
@@ -2449,7 +2450,7 @@
           <a:p>
             <a:fld id="{D296FE55-24A0-4405-87BA-F203EB2AA989}" type="datetimeFigureOut">
               <a:rPr lang="en-US" smtClean="0"/>
-              <a:t>4/30/2019</a:t>
+              <a:t>4/4/2021</a:t>
             </a:fld>
             <a:endParaRPr lang="en-US"/>
           </a:p>
@@ -2706,7 +2707,7 @@
           <a:p>
             <a:fld id="{D296FE55-24A0-4405-87BA-F203EB2AA989}" type="datetimeFigureOut">
               <a:rPr lang="en-US" smtClean="0"/>
-              <a:t>4/30/2019</a:t>
+              <a:t>4/4/2021</a:t>
             </a:fld>
             <a:endParaRPr lang="en-US"/>
           </a:p>
@@ -2919,7 +2920,7 @@
           <a:p>
             <a:fld id="{D296FE55-24A0-4405-87BA-F203EB2AA989}" type="datetimeFigureOut">
               <a:rPr lang="en-US" smtClean="0"/>
-              <a:t>4/30/2019</a:t>
+              <a:t>4/4/2021</a:t>
             </a:fld>
             <a:endParaRPr lang="en-US"/>
           </a:p>
@@ -3531,6 +3532,188 @@
     <p:extLst>
       <p:ext uri="{BB962C8B-B14F-4D97-AF65-F5344CB8AC3E}">
         <p14:creationId xmlns:p14="http://schemas.microsoft.com/office/powerpoint/2010/main" val="2702230131"/>
+      </p:ext>
+    </p:extLst>
+  </p:cSld>
+  <p:clrMapOvr>
+    <a:masterClrMapping/>
+  </p:clrMapOvr>
+</p:sld>
+</file>
+
+<file path=ppt/slides/slide3.xml><?xml version="1.0" encoding="utf-8"?>
+<p:sld xmlns:a="http://schemas.openxmlformats.org/drawingml/2006/main" xmlns:r="http://schemas.openxmlformats.org/officeDocument/2006/relationships" xmlns:p="http://schemas.openxmlformats.org/presentationml/2006/main">
+  <p:cSld>
+    <p:spTree>
+      <p:nvGrpSpPr>
+        <p:cNvPr id="1" name=""/>
+        <p:cNvGrpSpPr/>
+        <p:nvPr/>
+      </p:nvGrpSpPr>
+      <p:grpSpPr>
+        <a:xfrm>
+          <a:off x="0" y="0"/>
+          <a:ext cx="0" cy="0"/>
+          <a:chOff x="0" y="0"/>
+          <a:chExt cx="0" cy="0"/>
+        </a:xfrm>
+      </p:grpSpPr>
+      <p:sp>
+        <p:nvSpPr>
+          <p:cNvPr id="2" name="Rectangle 1"/>
+          <p:cNvSpPr/>
+          <p:nvPr/>
+        </p:nvSpPr>
+        <p:spPr>
+          <a:xfrm>
+            <a:off x="713638" y="-426960"/>
+            <a:ext cx="4059125" cy="2646878"/>
+          </a:xfrm>
+          <a:prstGeom prst="rect">
+            <a:avLst/>
+          </a:prstGeom>
+          <a:noFill/>
+        </p:spPr>
+        <p:txBody>
+          <a:bodyPr wrap="none" lIns="91440" tIns="45720" rIns="91440" bIns="45720">
+            <a:spAutoFit/>
+            <a:scene3d>
+              <a:camera prst="orthographicFront"/>
+              <a:lightRig rig="harsh" dir="t"/>
+            </a:scene3d>
+            <a:sp3d extrusionH="57150" prstMaterial="matte">
+              <a:bevelT w="63500" h="12700" prst="angle"/>
+              <a:contourClr>
+                <a:schemeClr val="bg1">
+                  <a:lumMod val="65000"/>
+                </a:schemeClr>
+              </a:contourClr>
+            </a:sp3d>
+          </a:bodyPr>
+          <a:lstStyle/>
+          <a:p>
+            <a:pPr algn="ctr"/>
+            <a:r>
+              <a:rPr lang="en-US" sz="16600" b="1" cap="none" spc="0" dirty="0" smtClean="0">
+                <a:ln/>
+                <a:solidFill>
+                  <a:schemeClr val="accent2">
+                    <a:lumMod val="75000"/>
+                  </a:schemeClr>
+                </a:solidFill>
+                <a:effectLst/>
+              </a:rPr>
+              <a:t>SSM</a:t>
+            </a:r>
+          </a:p>
+        </p:txBody>
+      </p:sp>
+      <p:sp>
+        <p:nvSpPr>
+          <p:cNvPr id="4" name="Rectangle 3"/>
+          <p:cNvSpPr/>
+          <p:nvPr/>
+        </p:nvSpPr>
+        <p:spPr>
+          <a:xfrm>
+            <a:off x="1360450" y="3225209"/>
+            <a:ext cx="2765501" cy="2646878"/>
+          </a:xfrm>
+          <a:prstGeom prst="rect">
+            <a:avLst/>
+          </a:prstGeom>
+          <a:noFill/>
+        </p:spPr>
+        <p:txBody>
+          <a:bodyPr wrap="none" lIns="91440" tIns="45720" rIns="91440" bIns="45720">
+            <a:spAutoFit/>
+            <a:scene3d>
+              <a:camera prst="orthographicFront"/>
+              <a:lightRig rig="harsh" dir="t"/>
+            </a:scene3d>
+            <a:sp3d extrusionH="57150" prstMaterial="matte">
+              <a:bevelT w="63500" h="12700" prst="angle"/>
+              <a:contourClr>
+                <a:schemeClr val="bg1">
+                  <a:lumMod val="65000"/>
+                </a:schemeClr>
+              </a:contourClr>
+            </a:sp3d>
+          </a:bodyPr>
+          <a:lstStyle/>
+          <a:p>
+            <a:pPr algn="ctr"/>
+            <a:r>
+              <a:rPr lang="en-US" sz="16600" b="1" cap="none" spc="0" dirty="0" smtClean="0">
+                <a:ln/>
+                <a:solidFill>
+                  <a:schemeClr val="accent1">
+                    <a:lumMod val="75000"/>
+                  </a:schemeClr>
+                </a:solidFill>
+                <a:effectLst/>
+              </a:rPr>
+              <a:t>SIS</a:t>
+            </a:r>
+            <a:endParaRPr lang="en-US" sz="16600" b="1" cap="none" spc="0" dirty="0">
+              <a:ln/>
+              <a:solidFill>
+                <a:schemeClr val="accent1">
+                  <a:lumMod val="75000"/>
+                </a:schemeClr>
+              </a:solidFill>
+              <a:effectLst/>
+            </a:endParaRPr>
+          </a:p>
+        </p:txBody>
+      </p:sp>
+      <p:sp>
+        <p:nvSpPr>
+          <p:cNvPr id="5" name="Up-Down Arrow 4"/>
+          <p:cNvSpPr/>
+          <p:nvPr/>
+        </p:nvSpPr>
+        <p:spPr>
+          <a:xfrm>
+            <a:off x="1047307" y="1893224"/>
+            <a:ext cx="3391786" cy="1658679"/>
+          </a:xfrm>
+          <a:prstGeom prst="upDownArrow">
+            <a:avLst>
+              <a:gd name="adj1" fmla="val 37461"/>
+              <a:gd name="adj2" fmla="val 32693"/>
+            </a:avLst>
+          </a:prstGeom>
+        </p:spPr>
+        <p:style>
+          <a:lnRef idx="2">
+            <a:schemeClr val="accent3">
+              <a:shade val="50000"/>
+            </a:schemeClr>
+          </a:lnRef>
+          <a:fillRef idx="1">
+            <a:schemeClr val="accent3"/>
+          </a:fillRef>
+          <a:effectRef idx="0">
+            <a:schemeClr val="accent3"/>
+          </a:effectRef>
+          <a:fontRef idx="minor">
+            <a:schemeClr val="lt1"/>
+          </a:fontRef>
+        </p:style>
+        <p:txBody>
+          <a:bodyPr rtlCol="0" anchor="ctr"/>
+          <a:lstStyle/>
+          <a:p>
+            <a:pPr algn="ctr"/>
+            <a:endParaRPr lang="en-US"/>
+          </a:p>
+        </p:txBody>
+      </p:sp>
+    </p:spTree>
+    <p:extLst>
+      <p:ext uri="{BB962C8B-B14F-4D97-AF65-F5344CB8AC3E}">
+        <p14:creationId xmlns:p14="http://schemas.microsoft.com/office/powerpoint/2010/main" val="2490228557"/>
       </p:ext>
     </p:extLst>
   </p:cSld>

</xml_diff>